<commit_message>
add sign for tyt
</commit_message>
<xml_diff>
--- a/lab1/appendix/AI.pptx
+++ b/lab1/appendix/AI.pptx
@@ -4437,6 +4437,68 @@
           </a:graphicData>
         </a:graphic>
       </p:graphicFrame>
+      <p:pic>
+        <p:nvPicPr>
+          <p:cNvPr id="3" name="图片 2">
+            <a:extLst>
+              <a:ext uri="{FF2B5EF4-FFF2-40B4-BE49-F238E27FC236}">
+                <a16:creationId xmlns:a16="http://schemas.microsoft.com/office/drawing/2014/main" id="{D7A23F92-FD23-0B18-E61D-F291F29524D8}"/>
+              </a:ext>
+            </a:extLst>
+          </p:cNvPr>
+          <p:cNvPicPr>
+            <a:picLocks noChangeAspect="1"/>
+          </p:cNvPicPr>
+          <p:nvPr/>
+        </p:nvPicPr>
+        <p:blipFill>
+          <a:blip r:embed="rId11">
+            <a:extLst>
+              <a:ext uri="{BEBA8EAE-BF5A-486C-A8C5-ECC9F3942E4B}">
+                <a14:imgProps xmlns:a14="http://schemas.microsoft.com/office/drawing/2010/main">
+                  <a14:imgLayer r:embed="rId12">
+                    <a14:imgEffect>
+                      <a14:backgroundRemoval t="10000" b="90000" l="10000" r="90000">
+                        <a14:foregroundMark x1="19663" y1="32119" x2="19663" y2="32119"/>
+                        <a14:foregroundMark x1="39700" y1="43709" x2="39700" y2="43709"/>
+                        <a14:foregroundMark x1="80899" y1="31126" x2="80899" y2="31126"/>
+                        <a14:backgroundMark x1="58427" y1="40728" x2="58427" y2="40728"/>
+                        <a14:backgroundMark x1="57865" y1="45033" x2="57865" y2="45033"/>
+                        <a14:backgroundMark x1="73408" y1="36424" x2="73408" y2="36424"/>
+                        <a14:backgroundMark x1="60861" y1="39073" x2="60861" y2="39073"/>
+                        <a14:backgroundMark x1="56929" y1="34437" x2="56929" y2="34437"/>
+                        <a14:backgroundMark x1="57303" y1="47682" x2="57303" y2="47682"/>
+                        <a14:backgroundMark x1="65543" y1="35099" x2="65543" y2="35099"/>
+                        <a14:backgroundMark x1="74906" y1="34768" x2="74906" y2="34768"/>
+                        <a14:backgroundMark x1="72285" y1="31457" x2="72285" y2="31457"/>
+                        <a14:backgroundMark x1="71723" y1="31788" x2="71723" y2="31788"/>
+                        <a14:backgroundMark x1="25281" y1="49007" x2="25281" y2="49007"/>
+                        <a14:backgroundMark x1="24532" y1="50662" x2="24532" y2="50662"/>
+                        <a14:backgroundMark x1="23596" y1="52980" x2="23596" y2="52980"/>
+                      </a14:backgroundRemoval>
+                    </a14:imgEffect>
+                  </a14:imgLayer>
+                </a14:imgProps>
+              </a:ext>
+              <a:ext uri="{28A0092B-C50C-407E-A947-70E740481C1C}">
+                <a14:useLocalDpi xmlns:a14="http://schemas.microsoft.com/office/drawing/2010/main" val="0"/>
+              </a:ext>
+            </a:extLst>
+          </a:blip>
+          <a:stretch>
+            <a:fillRect/>
+          </a:stretch>
+        </p:blipFill>
+        <p:spPr>
+          <a:xfrm>
+            <a:off x="4296288" y="5036371"/>
+            <a:ext cx="1819323" cy="1028905"/>
+          </a:xfrm>
+          <a:prstGeom prst="rect">
+            <a:avLst/>
+          </a:prstGeom>
+        </p:spPr>
+      </p:pic>
     </p:spTree>
     <p:extLst>
       <p:ext uri="{BB962C8B-B14F-4D97-AF65-F5344CB8AC3E}">

</xml_diff>